<commit_message>
created a morphed scale
</commit_message>
<xml_diff>
--- a/img/ins_single_face/instructions1.4.19.pptx
+++ b/img/ins_single_face/instructions1.4.19.pptx
@@ -7,12 +7,13 @@
   <p:sldIdLst>
     <p:sldId id="267" r:id="rId2"/>
     <p:sldId id="268" r:id="rId3"/>
-    <p:sldId id="257" r:id="rId4"/>
-    <p:sldId id="269" r:id="rId5"/>
-    <p:sldId id="270" r:id="rId6"/>
-    <p:sldId id="263" r:id="rId7"/>
-    <p:sldId id="260" r:id="rId8"/>
-    <p:sldId id="271" r:id="rId9"/>
+    <p:sldId id="272" r:id="rId4"/>
+    <p:sldId id="257" r:id="rId5"/>
+    <p:sldId id="269" r:id="rId6"/>
+    <p:sldId id="270" r:id="rId7"/>
+    <p:sldId id="263" r:id="rId8"/>
+    <p:sldId id="260" r:id="rId9"/>
+    <p:sldId id="271" r:id="rId10"/>
   </p:sldIdLst>
   <p:sldSz cx="24384000" cy="13716000"/>
   <p:notesSz cx="6858000" cy="9144000"/>
@@ -269,7 +270,7 @@
           <a:p>
             <a:fld id="{22BE98DE-5B02-5640-B1FB-9B77D9687ABA}" type="datetimeFigureOut">
               <a:rPr lang="en-US" smtClean="0"/>
-              <a:t>6/11/2019</a:t>
+              <a:t>9/4/2019</a:t>
             </a:fld>
             <a:endParaRPr lang="en-US"/>
           </a:p>
@@ -439,7 +440,7 @@
           <a:p>
             <a:fld id="{22BE98DE-5B02-5640-B1FB-9B77D9687ABA}" type="datetimeFigureOut">
               <a:rPr lang="en-US" smtClean="0"/>
-              <a:t>6/11/2019</a:t>
+              <a:t>9/4/2019</a:t>
             </a:fld>
             <a:endParaRPr lang="en-US"/>
           </a:p>
@@ -619,7 +620,7 @@
           <a:p>
             <a:fld id="{22BE98DE-5B02-5640-B1FB-9B77D9687ABA}" type="datetimeFigureOut">
               <a:rPr lang="en-US" smtClean="0"/>
-              <a:t>6/11/2019</a:t>
+              <a:t>9/4/2019</a:t>
             </a:fld>
             <a:endParaRPr lang="en-US"/>
           </a:p>
@@ -789,7 +790,7 @@
           <a:p>
             <a:fld id="{22BE98DE-5B02-5640-B1FB-9B77D9687ABA}" type="datetimeFigureOut">
               <a:rPr lang="en-US" smtClean="0"/>
-              <a:t>6/11/2019</a:t>
+              <a:t>9/4/2019</a:t>
             </a:fld>
             <a:endParaRPr lang="en-US"/>
           </a:p>
@@ -1035,7 +1036,7 @@
           <a:p>
             <a:fld id="{22BE98DE-5B02-5640-B1FB-9B77D9687ABA}" type="datetimeFigureOut">
               <a:rPr lang="en-US" smtClean="0"/>
-              <a:t>6/11/2019</a:t>
+              <a:t>9/4/2019</a:t>
             </a:fld>
             <a:endParaRPr lang="en-US"/>
           </a:p>
@@ -1267,7 +1268,7 @@
           <a:p>
             <a:fld id="{22BE98DE-5B02-5640-B1FB-9B77D9687ABA}" type="datetimeFigureOut">
               <a:rPr lang="en-US" smtClean="0"/>
-              <a:t>6/11/2019</a:t>
+              <a:t>9/4/2019</a:t>
             </a:fld>
             <a:endParaRPr lang="en-US"/>
           </a:p>
@@ -1634,7 +1635,7 @@
           <a:p>
             <a:fld id="{22BE98DE-5B02-5640-B1FB-9B77D9687ABA}" type="datetimeFigureOut">
               <a:rPr lang="en-US" smtClean="0"/>
-              <a:t>6/11/2019</a:t>
+              <a:t>9/4/2019</a:t>
             </a:fld>
             <a:endParaRPr lang="en-US"/>
           </a:p>
@@ -1752,7 +1753,7 @@
           <a:p>
             <a:fld id="{22BE98DE-5B02-5640-B1FB-9B77D9687ABA}" type="datetimeFigureOut">
               <a:rPr lang="en-US" smtClean="0"/>
-              <a:t>6/11/2019</a:t>
+              <a:t>9/4/2019</a:t>
             </a:fld>
             <a:endParaRPr lang="en-US"/>
           </a:p>
@@ -1847,7 +1848,7 @@
           <a:p>
             <a:fld id="{22BE98DE-5B02-5640-B1FB-9B77D9687ABA}" type="datetimeFigureOut">
               <a:rPr lang="en-US" smtClean="0"/>
-              <a:t>6/11/2019</a:t>
+              <a:t>9/4/2019</a:t>
             </a:fld>
             <a:endParaRPr lang="en-US"/>
           </a:p>
@@ -2124,7 +2125,7 @@
           <a:p>
             <a:fld id="{22BE98DE-5B02-5640-B1FB-9B77D9687ABA}" type="datetimeFigureOut">
               <a:rPr lang="en-US" smtClean="0"/>
-              <a:t>6/11/2019</a:t>
+              <a:t>9/4/2019</a:t>
             </a:fld>
             <a:endParaRPr lang="en-US"/>
           </a:p>
@@ -2381,7 +2382,7 @@
           <a:p>
             <a:fld id="{22BE98DE-5B02-5640-B1FB-9B77D9687ABA}" type="datetimeFigureOut">
               <a:rPr lang="en-US" smtClean="0"/>
-              <a:t>6/11/2019</a:t>
+              <a:t>9/4/2019</a:t>
             </a:fld>
             <a:endParaRPr lang="en-US"/>
           </a:p>
@@ -2594,7 +2595,7 @@
             <a:fld id="{22BE98DE-5B02-5640-B1FB-9B77D9687ABA}" type="datetimeFigureOut">
               <a:rPr lang="en-US" smtClean="0"/>
               <a:pPr/>
-              <a:t>6/11/2019</a:t>
+              <a:t>9/4/2019</a:t>
             </a:fld>
             <a:endParaRPr lang="en-US" dirty="0"/>
           </a:p>
@@ -3463,45 +3464,101 @@
             <a:br>
               <a:rPr lang="en-US" sz="5400" dirty="0"/>
             </a:br>
+            <a:r>
+              <a:rPr lang="en-US" sz="5400" dirty="0"/>
+              <a:t/>
+            </a:r>
             <a:br>
               <a:rPr lang="en-US" sz="5400" dirty="0"/>
             </a:br>
+            <a:r>
+              <a:rPr lang="en-US" sz="5400" dirty="0"/>
+              <a:t/>
+            </a:r>
             <a:br>
               <a:rPr lang="en-US" sz="5400" dirty="0"/>
             </a:br>
+            <a:r>
+              <a:rPr lang="en-US" sz="5400" dirty="0"/>
+              <a:t/>
+            </a:r>
             <a:br>
               <a:rPr lang="en-US" sz="5400" dirty="0"/>
             </a:br>
+            <a:r>
+              <a:rPr lang="en-US" sz="5400" dirty="0"/>
+              <a:t/>
+            </a:r>
             <a:br>
               <a:rPr lang="en-US" sz="5400" dirty="0"/>
             </a:br>
+            <a:r>
+              <a:rPr lang="en-US" sz="5400" dirty="0"/>
+              <a:t/>
+            </a:r>
             <a:br>
               <a:rPr lang="en-US" sz="5400" dirty="0"/>
             </a:br>
+            <a:r>
+              <a:rPr lang="en-US" sz="5400" dirty="0"/>
+              <a:t/>
+            </a:r>
             <a:br>
               <a:rPr lang="en-US" sz="5400" dirty="0"/>
             </a:br>
+            <a:r>
+              <a:rPr lang="en-US" sz="5400" dirty="0"/>
+              <a:t/>
+            </a:r>
             <a:br>
               <a:rPr lang="en-US" sz="5400" dirty="0"/>
             </a:br>
+            <a:r>
+              <a:rPr lang="en-US" sz="5400" dirty="0"/>
+              <a:t/>
+            </a:r>
             <a:br>
               <a:rPr lang="en-US" sz="5400" dirty="0"/>
             </a:br>
+            <a:r>
+              <a:rPr lang="en-US" sz="5400" dirty="0"/>
+              <a:t/>
+            </a:r>
             <a:br>
               <a:rPr lang="en-US" sz="5400" dirty="0"/>
             </a:br>
+            <a:r>
+              <a:rPr lang="en-US" sz="5400" dirty="0"/>
+              <a:t/>
+            </a:r>
             <a:br>
               <a:rPr lang="en-US" sz="5400" dirty="0"/>
             </a:br>
+            <a:r>
+              <a:rPr lang="en-US" sz="5400" dirty="0"/>
+              <a:t/>
+            </a:r>
             <a:br>
               <a:rPr lang="en-US" sz="5400" dirty="0"/>
             </a:br>
+            <a:r>
+              <a:rPr lang="en-US" sz="5400" dirty="0"/>
+              <a:t/>
+            </a:r>
             <a:br>
               <a:rPr lang="en-US" sz="5400" dirty="0"/>
             </a:br>
             <a:r>
               <a:rPr lang="en-US" sz="5400" dirty="0"/>
-              <a:t>The face will on the screen for a brief moment. In order to take all the ratings in, try to focus your attention on it as much as possible. </a:t>
+              <a:t>The face will </a:t>
+            </a:r>
+            <a:r>
+              <a:rPr lang="en-US" sz="5400" dirty="0" smtClean="0"/>
+              <a:t>be on </a:t>
+            </a:r>
+            <a:r>
+              <a:rPr lang="en-US" sz="5400" dirty="0"/>
+              <a:t>the screen for a brief moment. In order to take all the ratings in, try to focus your attention on it as much as possible. </a:t>
             </a:r>
           </a:p>
         </p:txBody>
@@ -3592,8 +3649,8 @@
         </p:nvSpPr>
         <p:spPr>
           <a:xfrm>
-            <a:off x="341984" y="5074497"/>
-            <a:ext cx="24042016" cy="1783502"/>
+            <a:off x="5244353" y="2573344"/>
+            <a:ext cx="18440400" cy="1783502"/>
           </a:xfrm>
         </p:spPr>
         <p:txBody>
@@ -3603,11 +3660,23 @@
           <a:lstStyle/>
           <a:p>
             <a:pPr algn="l"/>
+            <a:r>
+              <a:rPr lang="en-US" altLang="zh-CN" sz="5799" dirty="0">
+                <a:cs typeface="Arial" panose="020B0604020202020204" pitchFamily="34" charset="0"/>
+              </a:rPr>
+              <a:t/>
+            </a:r>
             <a:br>
               <a:rPr lang="en-US" altLang="zh-CN" sz="5799" dirty="0">
                 <a:cs typeface="Arial" panose="020B0604020202020204" pitchFamily="34" charset="0"/>
               </a:rPr>
             </a:br>
+            <a:r>
+              <a:rPr lang="en-US" altLang="zh-CN" sz="5799" dirty="0">
+                <a:cs typeface="Arial" panose="020B0604020202020204" pitchFamily="34" charset="0"/>
+              </a:rPr>
+              <a:t/>
+            </a:r>
             <a:br>
               <a:rPr lang="en-US" altLang="zh-CN" sz="5799" dirty="0">
                 <a:cs typeface="Arial" panose="020B0604020202020204" pitchFamily="34" charset="0"/>
@@ -3617,107 +3686,149 @@
               <a:rPr lang="en-US" sz="5799" dirty="0">
                 <a:cs typeface="Arial" panose="020B0604020202020204" pitchFamily="34" charset="0"/>
               </a:rPr>
-              <a:t>​Following the face, a </a:t>
-            </a:r>
-            <a:r>
-              <a:rPr lang="en-US" altLang="zh-CN" sz="5799" dirty="0">
-                <a:cs typeface="Arial" panose="020B0604020202020204" pitchFamily="34" charset="0"/>
-              </a:rPr>
-              <a:t>scale</a:t>
+              <a:t>​Following the face, </a:t>
+            </a:r>
+            <a:r>
+              <a:rPr lang="en-US" sz="5799" dirty="0" smtClean="0">
+                <a:cs typeface="Arial" panose="020B0604020202020204" pitchFamily="34" charset="0"/>
+              </a:rPr>
+              <a:t>you will be asked to move the mouse left of the lin</a:t>
+            </a:r>
+            <a:r>
+              <a:rPr lang="en-US" sz="5799" dirty="0" smtClean="0">
+                <a:cs typeface="Arial" panose="020B0604020202020204" pitchFamily="34" charset="0"/>
+              </a:rPr>
+              <a:t>e to begin the rating phase</a:t>
             </a:r>
             <a:r>
               <a:rPr lang="en-US" sz="5799" dirty="0">
                 <a:cs typeface="Arial" panose="020B0604020202020204" pitchFamily="34" charset="0"/>
               </a:rPr>
-              <a:t> will appear in the middle of the screen.  </a:t>
+              <a:t/>
             </a:r>
             <a:br>
               <a:rPr lang="en-US" sz="5799" dirty="0">
                 <a:cs typeface="Arial" panose="020B0604020202020204" pitchFamily="34" charset="0"/>
               </a:rPr>
             </a:br>
+            <a:r>
+              <a:rPr lang="en-US" sz="5799" dirty="0">
+                <a:cs typeface="Arial" panose="020B0604020202020204" pitchFamily="34" charset="0"/>
+              </a:rPr>
+              <a:t/>
+            </a:r>
             <a:br>
               <a:rPr lang="en-US" sz="5799" dirty="0">
                 <a:cs typeface="Arial" panose="020B0604020202020204" pitchFamily="34" charset="0"/>
               </a:rPr>
             </a:br>
-            <a:r>
-              <a:rPr lang="en-US" sz="5799" dirty="0">
-                <a:cs typeface="Arial" panose="020B0604020202020204" pitchFamily="34" charset="0"/>
-              </a:rPr>
-              <a:t>By </a:t>
-            </a:r>
-            <a:r>
-              <a:rPr lang="en-US" altLang="zh-CN" sz="5799" dirty="0">
-                <a:cs typeface="Arial" panose="020B0604020202020204" pitchFamily="34" charset="0"/>
-              </a:rPr>
-              <a:t>moving the indicator</a:t>
-            </a:r>
-            <a:r>
-              <a:rPr lang="en-US" sz="5799" dirty="0">
-                <a:cs typeface="Arial" panose="020B0604020202020204" pitchFamily="34" charset="0"/>
-              </a:rPr>
-              <a:t>, </a:t>
-            </a:r>
-            <a:r>
-              <a:rPr lang="en-US" sz="5799" b="1" dirty="0">
-                <a:cs typeface="Arial" panose="020B0604020202020204" pitchFamily="34" charset="0"/>
-              </a:rPr>
-              <a:t>you are asked to estimate the emotional response of the face you just saw. </a:t>
-            </a:r>
-            <a:br>
-              <a:rPr lang="en-US" sz="5799" b="1" dirty="0">
-                <a:cs typeface="Arial" panose="020B0604020202020204" pitchFamily="34" charset="0"/>
-              </a:rPr>
-            </a:br>
-            <a:br>
-              <a:rPr lang="en-US" sz="5799" b="1" dirty="0">
-                <a:cs typeface="Arial" panose="020B0604020202020204" pitchFamily="34" charset="0"/>
-              </a:rPr>
-            </a:br>
-            <a:r>
-              <a:rPr lang="en-US" sz="5799" dirty="0">
-                <a:cs typeface="Arial" panose="020B0604020202020204" pitchFamily="34" charset="0"/>
-              </a:rPr>
-              <a:t>You have to move the indicator and click on it in order to move to the next page. </a:t>
-            </a:r>
-          </a:p>
-        </p:txBody>
-      </p:sp>
-      <p:pic>
-        <p:nvPicPr>
-          <p:cNvPr id="5" name="Picture 4">
+            <a:endParaRPr lang="en-US" sz="5799" dirty="0">
+              <a:cs typeface="Arial" panose="020B0604020202020204" pitchFamily="34" charset="0"/>
+            </a:endParaRPr>
+          </a:p>
+        </p:txBody>
+      </p:sp>
+      <p:cxnSp>
+        <p:nvCxnSpPr>
+          <p:cNvPr id="4" name="Straight Connector 3"/>
+          <p:cNvCxnSpPr/>
+          <p:nvPr/>
+        </p:nvCxnSpPr>
+        <p:spPr>
+          <a:xfrm>
+            <a:off x="2877671" y="0"/>
+            <a:ext cx="0" cy="13716000"/>
+          </a:xfrm>
+          <a:prstGeom prst="line">
+            <a:avLst/>
+          </a:prstGeom>
+          <a:ln w="57150">
+            <a:solidFill>
+              <a:schemeClr val="tx1"/>
+            </a:solidFill>
+          </a:ln>
+        </p:spPr>
+        <p:style>
+          <a:lnRef idx="1">
+            <a:schemeClr val="accent1"/>
+          </a:lnRef>
+          <a:fillRef idx="0">
+            <a:schemeClr val="accent1"/>
+          </a:fillRef>
+          <a:effectRef idx="0">
+            <a:schemeClr val="accent1"/>
+          </a:effectRef>
+          <a:fontRef idx="minor">
+            <a:schemeClr val="tx1"/>
+          </a:fontRef>
+        </p:style>
+      </p:cxnSp>
+      <p:sp>
+        <p:nvSpPr>
+          <p:cNvPr id="7" name="Title 1">
             <a:extLst>
               <a:ext uri="{FF2B5EF4-FFF2-40B4-BE49-F238E27FC236}">
-                <a16:creationId xmlns:a16="http://schemas.microsoft.com/office/drawing/2014/main" id="{C927A0F9-6710-6A4F-BF01-6EF7FFB7F3EC}"/>
+                <a16:creationId xmlns:a16="http://schemas.microsoft.com/office/drawing/2014/main" id="{21DCC761-EEA5-3B4F-AEC8-ED98BC41E974}"/>
               </a:ext>
             </a:extLst>
           </p:cNvPr>
-          <p:cNvPicPr>
-            <a:picLocks noChangeAspect="1"/>
-          </p:cNvPicPr>
+          <p:cNvSpPr txBox="1">
+            <a:spLocks/>
+          </p:cNvSpPr>
           <p:nvPr/>
-        </p:nvPicPr>
-        <p:blipFill>
-          <a:blip r:embed="rId2"/>
-          <a:stretch>
-            <a:fillRect/>
-          </a:stretch>
-        </p:blipFill>
+        </p:nvSpPr>
         <p:spPr>
           <a:xfrm>
-            <a:off x="580523" y="6857999"/>
-            <a:ext cx="22867968" cy="6858001"/>
+            <a:off x="3487270" y="5562837"/>
+            <a:ext cx="18440400" cy="1783502"/>
           </a:xfrm>
           <a:prstGeom prst="rect">
             <a:avLst/>
           </a:prstGeom>
         </p:spPr>
-      </p:pic>
+        <p:txBody>
+          <a:bodyPr vert="horz" lIns="91440" tIns="45720" rIns="91440" bIns="45720" rtlCol="0" anchor="b">
+            <a:noAutofit/>
+          </a:bodyPr>
+          <a:lstStyle>
+            <a:lvl1pPr algn="ctr" defTabSz="1828800" rtl="0" eaLnBrk="1" latinLnBrk="0" hangingPunct="1">
+              <a:lnSpc>
+                <a:spcPct val="90000"/>
+              </a:lnSpc>
+              <a:spcBef>
+                <a:spcPct val="0"/>
+              </a:spcBef>
+              <a:buNone/>
+              <a:defRPr sz="12000" b="0" i="0" kern="1200">
+                <a:solidFill>
+                  <a:schemeClr val="tx1"/>
+                </a:solidFill>
+                <a:latin typeface="Arial" panose="020B0604020202020204" pitchFamily="34" charset="0"/>
+                <a:ea typeface="+mj-ea"/>
+                <a:cs typeface="+mj-cs"/>
+              </a:defRPr>
+            </a:lvl1pPr>
+          </a:lstStyle>
+          <a:p>
+            <a:pPr algn="l"/>
+            <a:r>
+              <a:rPr lang="en-US" altLang="zh-CN" sz="5799" dirty="0">
+                <a:latin typeface="+mj-lt"/>
+                <a:cs typeface="Arial" panose="020B0604020202020204" pitchFamily="34" charset="0"/>
+              </a:rPr>
+              <a:t>Move mouse left of the line to begin</a:t>
+            </a:r>
+            <a:endParaRPr lang="en-US" sz="5799" dirty="0">
+              <a:latin typeface="+mj-lt"/>
+              <a:cs typeface="Arial" panose="020B0604020202020204" pitchFamily="34" charset="0"/>
+            </a:endParaRPr>
+          </a:p>
+        </p:txBody>
+      </p:sp>
     </p:spTree>
     <p:extLst>
       <p:ext uri="{BB962C8B-B14F-4D97-AF65-F5344CB8AC3E}">
-        <p14:creationId xmlns:p14="http://schemas.microsoft.com/office/powerpoint/2010/main" val="1787496859"/>
+        <p14:creationId xmlns:p14="http://schemas.microsoft.com/office/powerpoint/2010/main" val="2372441797"/>
       </p:ext>
     </p:extLst>
   </p:cSld>
@@ -3754,97 +3865,136 @@
       </p:grpSpPr>
       <p:sp>
         <p:nvSpPr>
-          <p:cNvPr id="7" name="Title 1">
+          <p:cNvPr id="2" name="Title 1">
             <a:extLst>
               <a:ext uri="{FF2B5EF4-FFF2-40B4-BE49-F238E27FC236}">
-                <a16:creationId xmlns:a16="http://schemas.microsoft.com/office/drawing/2014/main" id="{AC1207DB-B1B9-2640-A8F7-AF32188774C8}"/>
+                <a16:creationId xmlns:a16="http://schemas.microsoft.com/office/drawing/2014/main" id="{21DCC761-EEA5-3B4F-AEC8-ED98BC41E974}"/>
               </a:ext>
             </a:extLst>
           </p:cNvPr>
-          <p:cNvSpPr txBox="1">
-            <a:spLocks/>
-          </p:cNvSpPr>
-          <p:nvPr/>
+          <p:cNvSpPr>
+            <a:spLocks noGrp="1"/>
+          </p:cNvSpPr>
+          <p:nvPr>
+            <p:ph type="ctrTitle"/>
+          </p:nvPr>
         </p:nvSpPr>
         <p:spPr>
           <a:xfrm>
-            <a:off x="580523" y="3873175"/>
-            <a:ext cx="24297778" cy="1783502"/>
+            <a:off x="341984" y="5693062"/>
+            <a:ext cx="24042016" cy="1783502"/>
           </a:xfrm>
-          <a:prstGeom prst="rect">
-            <a:avLst/>
-          </a:prstGeom>
         </p:spPr>
         <p:txBody>
-          <a:bodyPr vert="horz" lIns="182856" tIns="91428" rIns="182856" bIns="91428" rtlCol="0" anchor="b">
+          <a:bodyPr>
             <a:noAutofit/>
           </a:bodyPr>
-          <a:lstStyle>
-            <a:lvl1pPr algn="ctr" defTabSz="914400" rtl="0" eaLnBrk="1" latinLnBrk="0" hangingPunct="1">
-              <a:lnSpc>
-                <a:spcPct val="90000"/>
-              </a:lnSpc>
-              <a:spcBef>
-                <a:spcPct val="0"/>
-              </a:spcBef>
-              <a:buNone/>
-              <a:defRPr sz="6000" kern="1200">
-                <a:solidFill>
-                  <a:schemeClr val="tx1"/>
-                </a:solidFill>
-                <a:latin typeface="+mj-lt"/>
-                <a:ea typeface="+mj-ea"/>
-                <a:cs typeface="+mj-cs"/>
-              </a:defRPr>
-            </a:lvl1pPr>
-          </a:lstStyle>
-          <a:p>
+          <a:lstStyle/>
+          <a:p>
+            <a:pPr algn="l"/>
+            <a:r>
+              <a:rPr lang="en-US" altLang="zh-CN" sz="5799" dirty="0">
+                <a:cs typeface="Arial" panose="020B0604020202020204" pitchFamily="34" charset="0"/>
+              </a:rPr>
+              <a:t/>
+            </a:r>
             <a:br>
               <a:rPr lang="en-US" altLang="zh-CN" sz="5799" dirty="0">
-                <a:latin typeface="Arial" panose="020B0604020202020204" pitchFamily="34" charset="0"/>
                 <a:cs typeface="Arial" panose="020B0604020202020204" pitchFamily="34" charset="0"/>
               </a:rPr>
             </a:br>
             <a:r>
               <a:rPr lang="en-US" altLang="zh-CN" sz="5799" dirty="0">
-                <a:latin typeface="Arial" panose="020B0604020202020204" pitchFamily="34" charset="0"/>
-                <a:cs typeface="Arial" panose="020B0604020202020204" pitchFamily="34" charset="0"/>
-              </a:rPr>
-              <a:t>Remember, the goal here is provide </a:t>
-            </a:r>
-          </a:p>
-          <a:p>
-            <a:endParaRPr lang="en-US" altLang="zh-CN" sz="2000" dirty="0">
-              <a:latin typeface="Arial" panose="020B0604020202020204" pitchFamily="34" charset="0"/>
-              <a:cs typeface="Arial" panose="020B0604020202020204" pitchFamily="34" charset="0"/>
-            </a:endParaRPr>
-          </a:p>
-          <a:p>
-            <a:r>
+                <a:cs typeface="Arial" panose="020B0604020202020204" pitchFamily="34" charset="0"/>
+              </a:rPr>
+              <a:t/>
+            </a:r>
+            <a:br>
               <a:rPr lang="en-US" altLang="zh-CN" sz="5799" dirty="0">
-                <a:latin typeface="Arial" panose="020B0604020202020204" pitchFamily="34" charset="0"/>
-                <a:cs typeface="Arial" panose="020B0604020202020204" pitchFamily="34" charset="0"/>
-              </a:rPr>
-              <a:t>YOUR ESTIMATION OF THE EMOTIONAL RESPONSE</a:t>
-            </a:r>
-            <a:r>
-              <a:rPr lang="en-US" altLang="zh-CN" sz="2000" dirty="0">
-                <a:latin typeface="Arial" panose="020B0604020202020204" pitchFamily="34" charset="0"/>
-                <a:cs typeface="Arial" panose="020B0604020202020204" pitchFamily="34" charset="0"/>
-              </a:rPr>
-              <a:t>  </a:t>
-            </a:r>
-          </a:p>
-          <a:p>
-            <a:r>
-              <a:rPr lang="en-US" altLang="zh-CN" sz="5799" dirty="0">
-                <a:latin typeface="Arial" panose="020B0604020202020204" pitchFamily="34" charset="0"/>
-                <a:cs typeface="Arial" panose="020B0604020202020204" pitchFamily="34" charset="0"/>
-              </a:rPr>
-              <a:t>of the face you just saw. </a:t>
-            </a:r>
+                <a:cs typeface="Arial" panose="020B0604020202020204" pitchFamily="34" charset="0"/>
+              </a:rPr>
+            </a:br>
+            <a:r>
+              <a:rPr lang="en-US" sz="5799" dirty="0" smtClean="0">
+                <a:cs typeface="Arial" panose="020B0604020202020204" pitchFamily="34" charset="0"/>
+              </a:rPr>
+              <a:t>​A face will then appear on the screen. </a:t>
+            </a:r>
+            <a:r>
+              <a:rPr lang="en-US" sz="5799" dirty="0" smtClean="0">
+                <a:cs typeface="Arial" panose="020B0604020202020204" pitchFamily="34" charset="0"/>
+              </a:rPr>
+              <a:t>When you move your mouse, the face will change from being neutral to expressing emotion</a:t>
+            </a:r>
+            <a:r>
+              <a:rPr lang="en-US" sz="5799" dirty="0">
+                <a:cs typeface="Arial" panose="020B0604020202020204" pitchFamily="34" charset="0"/>
+              </a:rPr>
+              <a:t>  </a:t>
+            </a:r>
+            <a:br>
+              <a:rPr lang="en-US" sz="5799" dirty="0">
+                <a:cs typeface="Arial" panose="020B0604020202020204" pitchFamily="34" charset="0"/>
+              </a:rPr>
+            </a:br>
+            <a:r>
+              <a:rPr lang="en-US" sz="5799" dirty="0">
+                <a:cs typeface="Arial" panose="020B0604020202020204" pitchFamily="34" charset="0"/>
+              </a:rPr>
+              <a:t/>
+            </a:r>
+            <a:br>
+              <a:rPr lang="en-US" sz="5799" dirty="0">
+                <a:cs typeface="Arial" panose="020B0604020202020204" pitchFamily="34" charset="0"/>
+              </a:rPr>
+            </a:br>
+            <a:r>
+              <a:rPr lang="en-US" sz="5799" dirty="0">
+                <a:cs typeface="Arial" panose="020B0604020202020204" pitchFamily="34" charset="0"/>
+              </a:rPr>
+              <a:t>By </a:t>
+            </a:r>
+            <a:r>
+              <a:rPr lang="en-US" altLang="zh-CN" sz="5799" dirty="0" smtClean="0">
+                <a:cs typeface="Arial" panose="020B0604020202020204" pitchFamily="34" charset="0"/>
+              </a:rPr>
+              <a:t>adjusting </a:t>
+            </a:r>
+            <a:r>
+              <a:rPr lang="en-US" altLang="zh-CN" sz="5799" dirty="0" smtClean="0">
+                <a:cs typeface="Arial" panose="020B0604020202020204" pitchFamily="34" charset="0"/>
+              </a:rPr>
+              <a:t>your mouse</a:t>
+            </a:r>
+            <a:r>
+              <a:rPr lang="en-US" sz="5799" dirty="0" smtClean="0">
+                <a:cs typeface="Arial" panose="020B0604020202020204" pitchFamily="34" charset="0"/>
+              </a:rPr>
+              <a:t>, </a:t>
+            </a:r>
+            <a:r>
+              <a:rPr lang="en-US" sz="5799" b="1" dirty="0">
+                <a:cs typeface="Arial" panose="020B0604020202020204" pitchFamily="34" charset="0"/>
+              </a:rPr>
+              <a:t>you are asked to estimate the emotional response of the face you just saw. </a:t>
+            </a:r>
+            <a:br>
+              <a:rPr lang="en-US" sz="5799" b="1" dirty="0">
+                <a:cs typeface="Arial" panose="020B0604020202020204" pitchFamily="34" charset="0"/>
+              </a:rPr>
+            </a:br>
+            <a:r>
+              <a:rPr lang="en-US" sz="5799" b="1" dirty="0">
+                <a:cs typeface="Arial" panose="020B0604020202020204" pitchFamily="34" charset="0"/>
+              </a:rPr>
+              <a:t/>
+            </a:r>
+            <a:br>
+              <a:rPr lang="en-US" sz="5799" b="1" dirty="0">
+                <a:cs typeface="Arial" panose="020B0604020202020204" pitchFamily="34" charset="0"/>
+              </a:rPr>
+            </a:br>
             <a:endParaRPr lang="en-US" sz="5799" dirty="0">
-              <a:latin typeface="Arial" panose="020B0604020202020204" pitchFamily="34" charset="0"/>
               <a:cs typeface="Arial" panose="020B0604020202020204" pitchFamily="34" charset="0"/>
             </a:endParaRPr>
           </a:p>
@@ -3855,7 +4005,7 @@
           <p:cNvPr id="4" name="Picture 3">
             <a:extLst>
               <a:ext uri="{FF2B5EF4-FFF2-40B4-BE49-F238E27FC236}">
-                <a16:creationId xmlns:a16="http://schemas.microsoft.com/office/drawing/2014/main" id="{53C2161E-9EEC-D04D-9753-DA9905FF4E72}"/>
+                <a16:creationId xmlns:a16="http://schemas.microsoft.com/office/drawing/2014/main" id="{4010F5EB-4DF2-42D0-9301-0EEBAFDE6E18}"/>
               </a:ext>
             </a:extLst>
           </p:cNvPr>
@@ -3872,8 +4022,8 @@
         </p:blipFill>
         <p:spPr>
           <a:xfrm>
-            <a:off x="580523" y="5640348"/>
-            <a:ext cx="22867968" cy="6858001"/>
+            <a:off x="10794119" y="6927678"/>
+            <a:ext cx="2795761" cy="3588884"/>
           </a:xfrm>
           <a:prstGeom prst="rect">
             <a:avLst/>
@@ -3883,7 +4033,7 @@
     </p:spTree>
     <p:extLst>
       <p:ext uri="{BB962C8B-B14F-4D97-AF65-F5344CB8AC3E}">
-        <p14:creationId xmlns:p14="http://schemas.microsoft.com/office/powerpoint/2010/main" val="1249271639"/>
+        <p14:creationId xmlns:p14="http://schemas.microsoft.com/office/powerpoint/2010/main" val="1787496859"/>
       </p:ext>
     </p:extLst>
   </p:cSld>
@@ -3920,6 +4070,149 @@
       </p:grpSpPr>
       <p:sp>
         <p:nvSpPr>
+          <p:cNvPr id="7" name="Title 1">
+            <a:extLst>
+              <a:ext uri="{FF2B5EF4-FFF2-40B4-BE49-F238E27FC236}">
+                <a16:creationId xmlns:a16="http://schemas.microsoft.com/office/drawing/2014/main" id="{AC1207DB-B1B9-2640-A8F7-AF32188774C8}"/>
+              </a:ext>
+            </a:extLst>
+          </p:cNvPr>
+          <p:cNvSpPr txBox="1">
+            <a:spLocks/>
+          </p:cNvSpPr>
+          <p:nvPr/>
+        </p:nvSpPr>
+        <p:spPr>
+          <a:xfrm>
+            <a:off x="580523" y="3873175"/>
+            <a:ext cx="24297778" cy="1783502"/>
+          </a:xfrm>
+          <a:prstGeom prst="rect">
+            <a:avLst/>
+          </a:prstGeom>
+        </p:spPr>
+        <p:txBody>
+          <a:bodyPr vert="horz" lIns="182856" tIns="91428" rIns="182856" bIns="91428" rtlCol="0" anchor="b">
+            <a:noAutofit/>
+          </a:bodyPr>
+          <a:lstStyle>
+            <a:lvl1pPr algn="ctr" defTabSz="914400" rtl="0" eaLnBrk="1" latinLnBrk="0" hangingPunct="1">
+              <a:lnSpc>
+                <a:spcPct val="90000"/>
+              </a:lnSpc>
+              <a:spcBef>
+                <a:spcPct val="0"/>
+              </a:spcBef>
+              <a:buNone/>
+              <a:defRPr sz="6000" kern="1200">
+                <a:solidFill>
+                  <a:schemeClr val="tx1"/>
+                </a:solidFill>
+                <a:latin typeface="+mj-lt"/>
+                <a:ea typeface="+mj-ea"/>
+                <a:cs typeface="+mj-cs"/>
+              </a:defRPr>
+            </a:lvl1pPr>
+          </a:lstStyle>
+          <a:p>
+            <a:r>
+              <a:rPr lang="en-US" altLang="zh-CN" sz="5799" dirty="0">
+                <a:latin typeface="Arial" panose="020B0604020202020204" pitchFamily="34" charset="0"/>
+                <a:cs typeface="Arial" panose="020B0604020202020204" pitchFamily="34" charset="0"/>
+              </a:rPr>
+              <a:t/>
+            </a:r>
+            <a:br>
+              <a:rPr lang="en-US" altLang="zh-CN" sz="5799" dirty="0">
+                <a:latin typeface="Arial" panose="020B0604020202020204" pitchFamily="34" charset="0"/>
+                <a:cs typeface="Arial" panose="020B0604020202020204" pitchFamily="34" charset="0"/>
+              </a:rPr>
+            </a:br>
+            <a:r>
+              <a:rPr lang="en-US" altLang="zh-CN" sz="5799" dirty="0">
+                <a:latin typeface="Arial" panose="020B0604020202020204" pitchFamily="34" charset="0"/>
+                <a:cs typeface="Arial" panose="020B0604020202020204" pitchFamily="34" charset="0"/>
+              </a:rPr>
+              <a:t>Remember, the goal here is provide </a:t>
+            </a:r>
+          </a:p>
+          <a:p>
+            <a:endParaRPr lang="en-US" altLang="zh-CN" sz="2000" dirty="0">
+              <a:latin typeface="Arial" panose="020B0604020202020204" pitchFamily="34" charset="0"/>
+              <a:cs typeface="Arial" panose="020B0604020202020204" pitchFamily="34" charset="0"/>
+            </a:endParaRPr>
+          </a:p>
+          <a:p>
+            <a:r>
+              <a:rPr lang="en-US" altLang="zh-CN" sz="5799" dirty="0">
+                <a:latin typeface="Arial" panose="020B0604020202020204" pitchFamily="34" charset="0"/>
+                <a:cs typeface="Arial" panose="020B0604020202020204" pitchFamily="34" charset="0"/>
+              </a:rPr>
+              <a:t>YOUR ESTIMATION OF THE EMOTIONAL RESPONSE</a:t>
+            </a:r>
+            <a:r>
+              <a:rPr lang="en-US" altLang="zh-CN" sz="2000" dirty="0">
+                <a:latin typeface="Arial" panose="020B0604020202020204" pitchFamily="34" charset="0"/>
+                <a:cs typeface="Arial" panose="020B0604020202020204" pitchFamily="34" charset="0"/>
+              </a:rPr>
+              <a:t>  </a:t>
+            </a:r>
+          </a:p>
+          <a:p>
+            <a:r>
+              <a:rPr lang="en-US" altLang="zh-CN" sz="5799" dirty="0">
+                <a:latin typeface="Arial" panose="020B0604020202020204" pitchFamily="34" charset="0"/>
+                <a:cs typeface="Arial" panose="020B0604020202020204" pitchFamily="34" charset="0"/>
+              </a:rPr>
+              <a:t>of the face you just saw. </a:t>
+            </a:r>
+            <a:endParaRPr lang="en-US" sz="5799" dirty="0">
+              <a:latin typeface="Arial" panose="020B0604020202020204" pitchFamily="34" charset="0"/>
+              <a:cs typeface="Arial" panose="020B0604020202020204" pitchFamily="34" charset="0"/>
+            </a:endParaRPr>
+          </a:p>
+        </p:txBody>
+      </p:sp>
+    </p:spTree>
+    <p:extLst>
+      <p:ext uri="{BB962C8B-B14F-4D97-AF65-F5344CB8AC3E}">
+        <p14:creationId xmlns:p14="http://schemas.microsoft.com/office/powerpoint/2010/main" val="1249271639"/>
+      </p:ext>
+    </p:extLst>
+  </p:cSld>
+  <p:clrMapOvr>
+    <a:masterClrMapping/>
+  </p:clrMapOvr>
+</p:sld>
+</file>
+
+<file path=ppt/slides/slide6.xml><?xml version="1.0" encoding="utf-8"?>
+<p:sld xmlns:a="http://schemas.openxmlformats.org/drawingml/2006/main" xmlns:r="http://schemas.openxmlformats.org/officeDocument/2006/relationships" xmlns:p="http://schemas.openxmlformats.org/presentationml/2006/main">
+  <p:cSld>
+    <p:bg>
+      <p:bgPr>
+        <a:solidFill>
+          <a:srgbClr val="AAAAAA"/>
+        </a:solidFill>
+        <a:effectLst/>
+      </p:bgPr>
+    </p:bg>
+    <p:spTree>
+      <p:nvGrpSpPr>
+        <p:cNvPr id="1" name=""/>
+        <p:cNvGrpSpPr/>
+        <p:nvPr/>
+      </p:nvGrpSpPr>
+      <p:grpSpPr>
+        <a:xfrm>
+          <a:off x="0" y="0"/>
+          <a:ext cx="0" cy="0"/>
+          <a:chOff x="0" y="0"/>
+          <a:chExt cx="0" cy="0"/>
+        </a:xfrm>
+      </p:grpSpPr>
+      <p:sp>
+        <p:nvSpPr>
           <p:cNvPr id="2" name="Title 1">
             <a:extLst>
               <a:ext uri="{FF2B5EF4-FFF2-40B4-BE49-F238E27FC236}">
@@ -3936,7 +4229,7 @@
         </p:nvSpPr>
         <p:spPr>
           <a:xfrm>
-            <a:off x="0" y="-276748"/>
+            <a:off x="1049650" y="2435698"/>
             <a:ext cx="23334350" cy="1484589"/>
           </a:xfrm>
         </p:spPr>
@@ -3947,6 +4240,13 @@
           <a:lstStyle/>
           <a:p>
             <a:pPr algn="l"/>
+            <a:r>
+              <a:rPr lang="en-US" altLang="zh-CN" sz="4000" dirty="0">
+                <a:latin typeface="Arial" panose="020B0604020202020204" pitchFamily="34" charset="0"/>
+                <a:cs typeface="Arial" panose="020B0604020202020204" pitchFamily="34" charset="0"/>
+              </a:rPr>
+              <a:t/>
+            </a:r>
             <a:br>
               <a:rPr lang="en-US" altLang="zh-CN" sz="4000" dirty="0">
                 <a:latin typeface="Arial" panose="020B0604020202020204" pitchFamily="34" charset="0"/>
@@ -4440,7 +4740,7 @@
 </p:sld>
 </file>
 
-<file path=ppt/slides/slide6.xml><?xml version="1.0" encoding="utf-8"?>
+<file path=ppt/slides/slide7.xml><?xml version="1.0" encoding="utf-8"?>
 <p:sld xmlns:a="http://schemas.openxmlformats.org/drawingml/2006/main" xmlns:r="http://schemas.openxmlformats.org/officeDocument/2006/relationships" xmlns:p="http://schemas.openxmlformats.org/presentationml/2006/main">
   <p:cSld>
     <p:bg>
@@ -4547,7 +4847,7 @@
 </p:sld>
 </file>
 
-<file path=ppt/slides/slide7.xml><?xml version="1.0" encoding="utf-8"?>
+<file path=ppt/slides/slide8.xml><?xml version="1.0" encoding="utf-8"?>
 <p:sld xmlns:a="http://schemas.openxmlformats.org/drawingml/2006/main" xmlns:r="http://schemas.openxmlformats.org/officeDocument/2006/relationships" xmlns:p="http://schemas.openxmlformats.org/presentationml/2006/main">
   <p:cSld>
     <p:bg>
@@ -4985,7 +5285,7 @@
 </p:sld>
 </file>
 
-<file path=ppt/slides/slide8.xml><?xml version="1.0" encoding="utf-8"?>
+<file path=ppt/slides/slide9.xml><?xml version="1.0" encoding="utf-8"?>
 <p:sld xmlns:a="http://schemas.openxmlformats.org/drawingml/2006/main" xmlns:r="http://schemas.openxmlformats.org/officeDocument/2006/relationships" xmlns:p="http://schemas.openxmlformats.org/presentationml/2006/main">
   <p:cSld>
     <p:bg>

</xml_diff>